<commit_message>
improved levels corrected typo in presentation
</commit_message>
<xml_diff>
--- a/Resources/docs/CGR Präsentation.pptx
+++ b/Resources/docs/CGR Präsentation.pptx
@@ -9202,11 +9202,7 @@
             <a:pPr lvl="1"/>
             <a:r>
               <a:rPr lang="de-CH" dirty="0" smtClean="0"/>
-              <a:t>Superklasse in </a:t>
-            </a:r>
-            <a:r>
-              <a:rPr lang="de-CH" dirty="0" smtClean="0"/>
-              <a:t>Cococs2D</a:t>
+              <a:t>Superklasse in Cococs2D</a:t>
             </a:r>
           </a:p>
           <a:p>
@@ -9215,7 +9211,6 @@
               <a:rPr lang="de-CH" dirty="0" smtClean="0"/>
               <a:t>Objekt auf dem Bildschirm</a:t>
             </a:r>
-            <a:endParaRPr lang="de-CH" dirty="0" smtClean="0"/>
           </a:p>
           <a:p>
             <a:pPr lvl="1"/>
@@ -12720,7 +12715,6 @@
               <a:rPr lang="de-CH" dirty="0" smtClean="0"/>
               <a:t>Grundstein für Zukunft</a:t>
             </a:r>
-            <a:endParaRPr lang="de-CH" dirty="0" smtClean="0"/>
           </a:p>
         </p:txBody>
       </p:sp>
@@ -13264,8 +13258,9 @@
           <a:p>
             <a:r>
               <a:rPr lang="de-CH" dirty="0" smtClean="0"/>
-              <a:t>Kindestraum</a:t>
-            </a:r>
+              <a:t>Kindheitstraum</a:t>
+            </a:r>
+            <a:endParaRPr lang="de-CH" dirty="0" smtClean="0"/>
           </a:p>
           <a:p>
             <a:pPr lvl="1"/>

</xml_diff>